<commit_message>
Updated risk analysis images
</commit_message>
<xml_diff>
--- a/RiskAnalysisWithOpenAIReasoning/Images/RiskAnalysisWithOpenAIReasoning-Pipeline.pptx
+++ b/RiskAnalysisWithOpenAIReasoning/Images/RiskAnalysisWithOpenAIReasoning-Pipeline.pptx
@@ -6,6 +6,7 @@
   </p:sldMasterIdLst>
   <p:sldIdLst>
     <p:sldId id="256" r:id="rId2"/>
+    <p:sldId id="257" r:id="rId3"/>
   </p:sldIdLst>
   <p:sldSz cx="12192000" cy="6858000"/>
   <p:notesSz cx="6858000" cy="9144000"/>
@@ -4461,6 +4462,1416 @@
 </p:sld>
 </file>
 
+<file path=ppt/slides/slide2.xml><?xml version="1.0" encoding="utf-8"?>
+<p:sld xmlns:a="http://schemas.openxmlformats.org/drawingml/2006/main" xmlns:r="http://schemas.openxmlformats.org/officeDocument/2006/relationships" xmlns:p="http://schemas.openxmlformats.org/presentationml/2006/main">
+  <p:cSld>
+    <p:spTree>
+      <p:nvGrpSpPr>
+        <p:cNvPr id="1" name=""/>
+        <p:cNvGrpSpPr/>
+        <p:nvPr/>
+      </p:nvGrpSpPr>
+      <p:grpSpPr>
+        <a:xfrm>
+          <a:off x="0" y="0"/>
+          <a:ext cx="0" cy="0"/>
+          <a:chOff x="0" y="0"/>
+          <a:chExt cx="0" cy="0"/>
+        </a:xfrm>
+      </p:grpSpPr>
+      <p:sp>
+        <p:nvSpPr>
+          <p:cNvPr id="38" name="Rectangle: Rounded Corners 37">
+            <a:extLst>
+              <a:ext uri="{FF2B5EF4-FFF2-40B4-BE49-F238E27FC236}">
+                <a16:creationId xmlns:a16="http://schemas.microsoft.com/office/drawing/2014/main" id="{51B73648-4D07-C89A-C871-16C573D69DD3}"/>
+              </a:ext>
+            </a:extLst>
+          </p:cNvPr>
+          <p:cNvSpPr/>
+          <p:nvPr/>
+        </p:nvSpPr>
+        <p:spPr>
+          <a:xfrm>
+            <a:off x="108716" y="480539"/>
+            <a:ext cx="5858016" cy="3438318"/>
+          </a:xfrm>
+          <a:prstGeom prst="roundRect">
+            <a:avLst/>
+          </a:prstGeom>
+          <a:solidFill>
+            <a:schemeClr val="bg1"/>
+          </a:solidFill>
+          <a:ln w="9525"/>
+        </p:spPr>
+        <p:style>
+          <a:lnRef idx="2">
+            <a:schemeClr val="accent1">
+              <a:shade val="15000"/>
+            </a:schemeClr>
+          </a:lnRef>
+          <a:fillRef idx="1">
+            <a:schemeClr val="accent1"/>
+          </a:fillRef>
+          <a:effectRef idx="0">
+            <a:schemeClr val="accent1"/>
+          </a:effectRef>
+          <a:fontRef idx="minor">
+            <a:schemeClr val="lt1"/>
+          </a:fontRef>
+        </p:style>
+        <p:txBody>
+          <a:bodyPr rtlCol="0" anchor="t"/>
+          <a:lstStyle/>
+          <a:p>
+            <a:pPr algn="just">
+              <a:spcBef>
+                <a:spcPts val="900"/>
+              </a:spcBef>
+              <a:spcAft>
+                <a:spcPts val="0"/>
+              </a:spcAft>
+            </a:pPr>
+            <a:r>
+              <a:rPr lang="en-US" sz="700" b="0" i="0" dirty="0">
+                <a:solidFill>
+                  <a:srgbClr val="000000"/>
+                </a:solidFill>
+                <a:effectLst/>
+                <a:latin typeface="Cascadia Mono" panose="020B0609020000020004" pitchFamily="49" charset="0"/>
+                <a:cs typeface="Cascadia Mono" panose="020B0609020000020004" pitchFamily="49" charset="0"/>
+              </a:rPr>
+              <a:t>Companies compete with us based on a growing variety of business models.</a:t>
+            </a:r>
+          </a:p>
+          <a:p>
+            <a:pPr algn="just">
+              <a:spcBef>
+                <a:spcPts val="450"/>
+              </a:spcBef>
+              <a:spcAft>
+                <a:spcPts val="0"/>
+              </a:spcAft>
+            </a:pPr>
+            <a:r>
+              <a:rPr lang="en-US" sz="700" b="0" i="0" dirty="0">
+                <a:solidFill>
+                  <a:srgbClr val="000000"/>
+                </a:solidFill>
+                <a:effectLst/>
+                <a:latin typeface="Cascadia Mono" panose="020B0609020000020004" pitchFamily="49" charset="0"/>
+                <a:cs typeface="Cascadia Mono" panose="020B0609020000020004" pitchFamily="49" charset="0"/>
+              </a:rPr>
+              <a:t>•Even as we transition more of our business to infrastructure-, platform-, and software-as-a-service business model, the license-based proprietary software model generates a substantial portion of our software revenue. We bear the costs of converting original ideas into software products through investments in research and development, offsetting these costs with the revenue received from licensing our products. Many of our competitors also develop and sell software to businesses and consumers under this model.</a:t>
+            </a:r>
+          </a:p>
+          <a:p>
+            <a:pPr algn="just">
+              <a:spcBef>
+                <a:spcPts val="450"/>
+              </a:spcBef>
+              <a:spcAft>
+                <a:spcPts val="0"/>
+              </a:spcAft>
+            </a:pPr>
+            <a:r>
+              <a:rPr lang="en-US" sz="700" b="0" i="0" dirty="0">
+                <a:solidFill>
+                  <a:srgbClr val="000000"/>
+                </a:solidFill>
+                <a:effectLst/>
+                <a:latin typeface="Cascadia Mono" panose="020B0609020000020004" pitchFamily="49" charset="0"/>
+                <a:cs typeface="Cascadia Mono" panose="020B0609020000020004" pitchFamily="49" charset="0"/>
+              </a:rPr>
+              <a:t>•We are investing in artificial intelligence (“AI”) across the entire company and infusing generative AI capabilities into our consumer and commercial offerings. We expect AI technology and services to be a highly competitive and rapidly evolving market. We will bear significant development and operational costs to build and support the AI capabilities, products, and services necessary to meet the needs of our customers. To compete effectively we must also be responsive to technological change, potential regulatory developments, and public scrutiny.</a:t>
+            </a:r>
+          </a:p>
+          <a:p>
+            <a:pPr algn="just">
+              <a:spcBef>
+                <a:spcPts val="450"/>
+              </a:spcBef>
+              <a:spcAft>
+                <a:spcPts val="0"/>
+              </a:spcAft>
+            </a:pPr>
+            <a:r>
+              <a:rPr lang="en-US" sz="700" b="0" i="0" dirty="0">
+                <a:solidFill>
+                  <a:srgbClr val="000000"/>
+                </a:solidFill>
+                <a:effectLst/>
+                <a:latin typeface="Cascadia Mono" panose="020B0609020000020004" pitchFamily="49" charset="0"/>
+                <a:cs typeface="Cascadia Mono" panose="020B0609020000020004" pitchFamily="49" charset="0"/>
+              </a:rPr>
+              <a:t>•Other competitors develop and offer free applications, online services, and content, and make money by selling third-party advertising. Advertising revenue funds development of products and services these competitors provide to users at no or little cost, competing directly with our revenue-generating products.</a:t>
+            </a:r>
+          </a:p>
+          <a:p>
+            <a:pPr algn="just">
+              <a:spcBef>
+                <a:spcPts val="450"/>
+              </a:spcBef>
+              <a:spcAft>
+                <a:spcPts val="0"/>
+              </a:spcAft>
+            </a:pPr>
+            <a:r>
+              <a:rPr lang="en-US" sz="700" b="0" i="0" dirty="0">
+                <a:solidFill>
+                  <a:srgbClr val="000000"/>
+                </a:solidFill>
+                <a:effectLst/>
+                <a:latin typeface="Cascadia Mono" panose="020B0609020000020004" pitchFamily="49" charset="0"/>
+                <a:cs typeface="Cascadia Mono" panose="020B0609020000020004" pitchFamily="49" charset="0"/>
+              </a:rPr>
+              <a:t>•Some companies compete with us by modifying and then distributing open source software at little or no cost to end users, using open source AI models, and earning revenue on advertising or integrated products and services. These firms do not bear the full costs of research and development for the open source products. Some open source products mimic the features and functionality of our products.</a:t>
+            </a:r>
+          </a:p>
+        </p:txBody>
+      </p:sp>
+      <p:sp>
+        <p:nvSpPr>
+          <p:cNvPr id="39" name="TextBox 38">
+            <a:extLst>
+              <a:ext uri="{FF2B5EF4-FFF2-40B4-BE49-F238E27FC236}">
+                <a16:creationId xmlns:a16="http://schemas.microsoft.com/office/drawing/2014/main" id="{89810DA6-2DC1-393A-22EC-F8A23BD58E22}"/>
+              </a:ext>
+            </a:extLst>
+          </p:cNvPr>
+          <p:cNvSpPr txBox="1"/>
+          <p:nvPr/>
+        </p:nvSpPr>
+        <p:spPr>
+          <a:xfrm>
+            <a:off x="108715" y="4041967"/>
+            <a:ext cx="2026281" cy="246221"/>
+          </a:xfrm>
+          <a:prstGeom prst="rect">
+            <a:avLst/>
+          </a:prstGeom>
+          <a:noFill/>
+        </p:spPr>
+        <p:txBody>
+          <a:bodyPr wrap="square" rtlCol="0">
+            <a:spAutoFit/>
+          </a:bodyPr>
+          <a:lstStyle/>
+          <a:p>
+            <a:r>
+              <a:rPr lang="en-US" sz="1000" b="1" dirty="0"/>
+              <a:t>Prompt Instructions</a:t>
+            </a:r>
+          </a:p>
+        </p:txBody>
+      </p:sp>
+      <p:sp>
+        <p:nvSpPr>
+          <p:cNvPr id="40" name="Rectangle: Rounded Corners 39">
+            <a:extLst>
+              <a:ext uri="{FF2B5EF4-FFF2-40B4-BE49-F238E27FC236}">
+                <a16:creationId xmlns:a16="http://schemas.microsoft.com/office/drawing/2014/main" id="{95AE83D1-B4EF-DBE0-A7DB-1226B8076D05}"/>
+              </a:ext>
+            </a:extLst>
+          </p:cNvPr>
+          <p:cNvSpPr/>
+          <p:nvPr/>
+        </p:nvSpPr>
+        <p:spPr>
+          <a:xfrm>
+            <a:off x="108715" y="4311563"/>
+            <a:ext cx="11974567" cy="914778"/>
+          </a:xfrm>
+          <a:prstGeom prst="roundRect">
+            <a:avLst/>
+          </a:prstGeom>
+          <a:solidFill>
+            <a:schemeClr val="bg1"/>
+          </a:solidFill>
+          <a:ln w="9525"/>
+        </p:spPr>
+        <p:style>
+          <a:lnRef idx="2">
+            <a:schemeClr val="accent1">
+              <a:shade val="15000"/>
+            </a:schemeClr>
+          </a:lnRef>
+          <a:fillRef idx="1">
+            <a:schemeClr val="accent1"/>
+          </a:fillRef>
+          <a:effectRef idx="0">
+            <a:schemeClr val="accent1"/>
+          </a:effectRef>
+          <a:fontRef idx="minor">
+            <a:schemeClr val="lt1"/>
+          </a:fontRef>
+        </p:style>
+        <p:txBody>
+          <a:bodyPr rtlCol="0" anchor="t"/>
+          <a:lstStyle/>
+          <a:p>
+            <a:r>
+              <a:rPr lang="en-US" sz="700" dirty="0">
+                <a:solidFill>
+                  <a:schemeClr val="tx1"/>
+                </a:solidFill>
+                <a:highlight>
+                  <a:srgbClr val="FFFFFF"/>
+                </a:highlight>
+                <a:latin typeface="Cascadia Mono" panose="020B0609020000020004" pitchFamily="49" charset="0"/>
+              </a:rPr>
+              <a:t> Please compare the risk factors from 2023 to 2024 by creating a Markdown table that shows the changes in risk factors between the two years. The Markdown compliant table should include the following columns:</a:t>
+            </a:r>
+          </a:p>
+          <a:p>
+            <a:r>
+              <a:rPr lang="en-US" sz="700" dirty="0">
+                <a:solidFill>
+                  <a:schemeClr val="tx1"/>
+                </a:solidFill>
+                <a:highlight>
+                  <a:srgbClr val="FFFFFF"/>
+                </a:highlight>
+                <a:latin typeface="Cascadia Mono" panose="020B0609020000020004" pitchFamily="49" charset="0"/>
+              </a:rPr>
+              <a:t>            1. Title, a brief summary Title for the Risk Factor</a:t>
+            </a:r>
+          </a:p>
+          <a:p>
+            <a:r>
+              <a:rPr lang="en-US" sz="700" dirty="0">
+                <a:solidFill>
+                  <a:schemeClr val="tx1"/>
+                </a:solidFill>
+                <a:highlight>
+                  <a:srgbClr val="FFFFFF"/>
+                </a:highlight>
+                <a:latin typeface="Cascadia Mono" panose="020B0609020000020004" pitchFamily="49" charset="0"/>
+              </a:rPr>
+              <a:t>            2. 2023 Risk Factor Summary: A brief summary of the risk factor from the 2023 10-K report.</a:t>
+            </a:r>
+          </a:p>
+          <a:p>
+            <a:r>
+              <a:rPr lang="en-US" sz="700" dirty="0">
+                <a:solidFill>
+                  <a:schemeClr val="tx1"/>
+                </a:solidFill>
+                <a:highlight>
+                  <a:srgbClr val="FFFFFF"/>
+                </a:highlight>
+                <a:latin typeface="Cascadia Mono" panose="020B0609020000020004" pitchFamily="49" charset="0"/>
+              </a:rPr>
+              <a:t>            3. 2024 Risk Factor Summary: A brief summary of the risk factor from the 2024 10-K report.</a:t>
+            </a:r>
+          </a:p>
+          <a:p>
+            <a:r>
+              <a:rPr lang="en-US" sz="700" dirty="0">
+                <a:solidFill>
+                  <a:schemeClr val="tx1"/>
+                </a:solidFill>
+                <a:highlight>
+                  <a:srgbClr val="FFFFFF"/>
+                </a:highlight>
+                <a:latin typeface="Cascadia Mono" panose="020B0609020000020004" pitchFamily="49" charset="0"/>
+              </a:rPr>
+              <a:t>            4. Change, description of the change between 2023 and 2024. </a:t>
+            </a:r>
+          </a:p>
+          <a:p>
+            <a:r>
+              <a:rPr lang="en-US" sz="700" dirty="0">
+                <a:solidFill>
+                  <a:schemeClr val="tx1"/>
+                </a:solidFill>
+                <a:highlight>
+                  <a:srgbClr val="FFFFFF"/>
+                </a:highlight>
+                <a:latin typeface="Cascadia Mono" panose="020B0609020000020004" pitchFamily="49" charset="0"/>
+              </a:rPr>
+              <a:t>Describe how the risk factor has evolved, specifying if it is new, modified, or removed. Match and align similar risk factors from both years, even if the wording has changed, to accurately reflect modifications. Ensure the table is properly formatted in Markdown and includes sequential row numbers. Generate a markdown table without enclosing it in a code block. </a:t>
+            </a:r>
+            <a:endParaRPr lang="en-US" sz="700" dirty="0">
+              <a:solidFill>
+                <a:schemeClr val="tx1"/>
+              </a:solidFill>
+            </a:endParaRPr>
+          </a:p>
+        </p:txBody>
+      </p:sp>
+      <p:sp>
+        <p:nvSpPr>
+          <p:cNvPr id="47" name="Rectangle: Rounded Corners 46">
+            <a:extLst>
+              <a:ext uri="{FF2B5EF4-FFF2-40B4-BE49-F238E27FC236}">
+                <a16:creationId xmlns:a16="http://schemas.microsoft.com/office/drawing/2014/main" id="{969C574D-13D9-E4E8-AA17-7A9E28E9F8D1}"/>
+              </a:ext>
+            </a:extLst>
+          </p:cNvPr>
+          <p:cNvSpPr/>
+          <p:nvPr/>
+        </p:nvSpPr>
+        <p:spPr>
+          <a:xfrm>
+            <a:off x="-683218" y="8236684"/>
+            <a:ext cx="5551407" cy="246221"/>
+          </a:xfrm>
+          <a:prstGeom prst="roundRect">
+            <a:avLst/>
+          </a:prstGeom>
+          <a:solidFill>
+            <a:schemeClr val="bg1"/>
+          </a:solidFill>
+          <a:ln w="9525"/>
+        </p:spPr>
+        <p:style>
+          <a:lnRef idx="2">
+            <a:schemeClr val="accent1">
+              <a:shade val="15000"/>
+            </a:schemeClr>
+          </a:lnRef>
+          <a:fillRef idx="1">
+            <a:schemeClr val="accent1"/>
+          </a:fillRef>
+          <a:effectRef idx="0">
+            <a:schemeClr val="accent1"/>
+          </a:effectRef>
+          <a:fontRef idx="minor">
+            <a:schemeClr val="lt1"/>
+          </a:fontRef>
+        </p:style>
+        <p:txBody>
+          <a:bodyPr rtlCol="0" anchor="ctr"/>
+          <a:lstStyle/>
+          <a:p>
+            <a:pPr algn="ctr"/>
+            <a:r>
+              <a:rPr lang="en-US" sz="1000" dirty="0">
+                <a:solidFill>
+                  <a:srgbClr val="000000"/>
+                </a:solidFill>
+                <a:latin typeface="Cascadia Mono" panose="020B0609020000020004" pitchFamily="49" charset="0"/>
+              </a:rPr>
+              <a:t>The New York Mets Were founded in 1962.</a:t>
+            </a:r>
+            <a:endParaRPr lang="en-US" sz="1000" dirty="0"/>
+          </a:p>
+        </p:txBody>
+      </p:sp>
+      <p:sp>
+        <p:nvSpPr>
+          <p:cNvPr id="48" name="TextBox 47">
+            <a:extLst>
+              <a:ext uri="{FF2B5EF4-FFF2-40B4-BE49-F238E27FC236}">
+                <a16:creationId xmlns:a16="http://schemas.microsoft.com/office/drawing/2014/main" id="{73FF01DC-150E-5233-7D8D-057DA8A6E73E}"/>
+              </a:ext>
+            </a:extLst>
+          </p:cNvPr>
+          <p:cNvSpPr txBox="1"/>
+          <p:nvPr/>
+        </p:nvSpPr>
+        <p:spPr>
+          <a:xfrm>
+            <a:off x="-678542" y="7990463"/>
+            <a:ext cx="5551407" cy="246221"/>
+          </a:xfrm>
+          <a:prstGeom prst="rect">
+            <a:avLst/>
+          </a:prstGeom>
+          <a:noFill/>
+        </p:spPr>
+        <p:txBody>
+          <a:bodyPr wrap="square" rtlCol="0">
+            <a:spAutoFit/>
+          </a:bodyPr>
+          <a:lstStyle/>
+          <a:p>
+            <a:pPr algn="ctr"/>
+            <a:r>
+              <a:rPr lang="en-US" sz="1000" b="1" dirty="0"/>
+              <a:t>Output to Prompt Instruction #1</a:t>
+            </a:r>
+          </a:p>
+        </p:txBody>
+      </p:sp>
+      <p:sp>
+        <p:nvSpPr>
+          <p:cNvPr id="50" name="Rectangle: Rounded Corners 49">
+            <a:extLst>
+              <a:ext uri="{FF2B5EF4-FFF2-40B4-BE49-F238E27FC236}">
+                <a16:creationId xmlns:a16="http://schemas.microsoft.com/office/drawing/2014/main" id="{6B1D66F4-F8C9-16BE-8903-F89B19C499B1}"/>
+              </a:ext>
+            </a:extLst>
+          </p:cNvPr>
+          <p:cNvSpPr/>
+          <p:nvPr/>
+        </p:nvSpPr>
+        <p:spPr>
+          <a:xfrm>
+            <a:off x="5302625" y="8236684"/>
+            <a:ext cx="5551407" cy="246221"/>
+          </a:xfrm>
+          <a:prstGeom prst="roundRect">
+            <a:avLst/>
+          </a:prstGeom>
+          <a:solidFill>
+            <a:schemeClr val="bg1"/>
+          </a:solidFill>
+          <a:ln w="9525"/>
+        </p:spPr>
+        <p:style>
+          <a:lnRef idx="2">
+            <a:schemeClr val="accent1">
+              <a:shade val="15000"/>
+            </a:schemeClr>
+          </a:lnRef>
+          <a:fillRef idx="1">
+            <a:schemeClr val="accent1"/>
+          </a:fillRef>
+          <a:effectRef idx="0">
+            <a:schemeClr val="accent1"/>
+          </a:effectRef>
+          <a:fontRef idx="minor">
+            <a:schemeClr val="lt1"/>
+          </a:fontRef>
+        </p:style>
+        <p:txBody>
+          <a:bodyPr rtlCol="0" anchor="ctr"/>
+          <a:lstStyle/>
+          <a:p>
+            <a:pPr algn="ctr"/>
+            <a:r>
+              <a:rPr lang="en-US" sz="1000" dirty="0">
+                <a:solidFill>
+                  <a:srgbClr val="000000"/>
+                </a:solidFill>
+                <a:latin typeface="Cascadia Mono" panose="020B0609020000020004" pitchFamily="49" charset="0"/>
+              </a:rPr>
+              <a:t>True</a:t>
+            </a:r>
+            <a:endParaRPr lang="en-US" sz="1000" dirty="0"/>
+          </a:p>
+        </p:txBody>
+      </p:sp>
+      <p:sp>
+        <p:nvSpPr>
+          <p:cNvPr id="51" name="TextBox 50">
+            <a:extLst>
+              <a:ext uri="{FF2B5EF4-FFF2-40B4-BE49-F238E27FC236}">
+                <a16:creationId xmlns:a16="http://schemas.microsoft.com/office/drawing/2014/main" id="{CAC17C47-EDDF-1A7F-411E-9BC40FF75F5D}"/>
+              </a:ext>
+            </a:extLst>
+          </p:cNvPr>
+          <p:cNvSpPr txBox="1"/>
+          <p:nvPr/>
+        </p:nvSpPr>
+        <p:spPr>
+          <a:xfrm>
+            <a:off x="5220277" y="7990463"/>
+            <a:ext cx="5687911" cy="246221"/>
+          </a:xfrm>
+          <a:prstGeom prst="rect">
+            <a:avLst/>
+          </a:prstGeom>
+          <a:noFill/>
+        </p:spPr>
+        <p:txBody>
+          <a:bodyPr wrap="square" rtlCol="0">
+            <a:spAutoFit/>
+          </a:bodyPr>
+          <a:lstStyle/>
+          <a:p>
+            <a:pPr algn="ctr"/>
+            <a:r>
+              <a:rPr lang="en-US" sz="1000" b="1" dirty="0"/>
+              <a:t>Output to Prompt Instruction #2</a:t>
+            </a:r>
+          </a:p>
+        </p:txBody>
+      </p:sp>
+      <p:sp>
+        <p:nvSpPr>
+          <p:cNvPr id="52" name="Rectangle: Rounded Corners 51">
+            <a:extLst>
+              <a:ext uri="{FF2B5EF4-FFF2-40B4-BE49-F238E27FC236}">
+                <a16:creationId xmlns:a16="http://schemas.microsoft.com/office/drawing/2014/main" id="{2B46B91E-9651-71F9-88A3-5CC739D58B53}"/>
+              </a:ext>
+            </a:extLst>
+          </p:cNvPr>
+          <p:cNvSpPr/>
+          <p:nvPr/>
+        </p:nvSpPr>
+        <p:spPr>
+          <a:xfrm>
+            <a:off x="5302623" y="8761927"/>
+            <a:ext cx="5551407" cy="246221"/>
+          </a:xfrm>
+          <a:prstGeom prst="roundRect">
+            <a:avLst/>
+          </a:prstGeom>
+          <a:solidFill>
+            <a:schemeClr val="bg1"/>
+          </a:solidFill>
+          <a:ln w="9525"/>
+        </p:spPr>
+        <p:style>
+          <a:lnRef idx="2">
+            <a:schemeClr val="accent1">
+              <a:shade val="15000"/>
+            </a:schemeClr>
+          </a:lnRef>
+          <a:fillRef idx="1">
+            <a:schemeClr val="accent1"/>
+          </a:fillRef>
+          <a:effectRef idx="0">
+            <a:schemeClr val="accent1"/>
+          </a:effectRef>
+          <a:fontRef idx="minor">
+            <a:schemeClr val="lt1"/>
+          </a:fontRef>
+        </p:style>
+        <p:txBody>
+          <a:bodyPr rtlCol="0" anchor="ctr"/>
+          <a:lstStyle/>
+          <a:p>
+            <a:pPr algn="ctr"/>
+            <a:r>
+              <a:rPr lang="en-US" sz="1000" dirty="0">
+                <a:solidFill>
+                  <a:srgbClr val="000000"/>
+                </a:solidFill>
+                <a:latin typeface="Cascadia Mono" panose="020B0609020000020004" pitchFamily="49" charset="0"/>
+              </a:rPr>
+              <a:t>Probability &gt;99.9%</a:t>
+            </a:r>
+            <a:endParaRPr lang="en-US" sz="1000" dirty="0"/>
+          </a:p>
+        </p:txBody>
+      </p:sp>
+      <p:sp>
+        <p:nvSpPr>
+          <p:cNvPr id="53" name="TextBox 52">
+            <a:extLst>
+              <a:ext uri="{FF2B5EF4-FFF2-40B4-BE49-F238E27FC236}">
+                <a16:creationId xmlns:a16="http://schemas.microsoft.com/office/drawing/2014/main" id="{7B96998C-8115-2813-9E8A-EE21C1D7F755}"/>
+              </a:ext>
+            </a:extLst>
+          </p:cNvPr>
+          <p:cNvSpPr txBox="1"/>
+          <p:nvPr/>
+        </p:nvSpPr>
+        <p:spPr>
+          <a:xfrm>
+            <a:off x="5220277" y="8515706"/>
+            <a:ext cx="5551407" cy="246221"/>
+          </a:xfrm>
+          <a:prstGeom prst="rect">
+            <a:avLst/>
+          </a:prstGeom>
+          <a:noFill/>
+        </p:spPr>
+        <p:txBody>
+          <a:bodyPr wrap="square" rtlCol="0">
+            <a:spAutoFit/>
+          </a:bodyPr>
+          <a:lstStyle/>
+          <a:p>
+            <a:pPr algn="ctr"/>
+            <a:r>
+              <a:rPr lang="en-US" sz="1000" b="1" dirty="0"/>
+              <a:t>LogProbs Data</a:t>
+            </a:r>
+          </a:p>
+        </p:txBody>
+      </p:sp>
+      <p:sp>
+        <p:nvSpPr>
+          <p:cNvPr id="68" name="TextBox 67">
+            <a:extLst>
+              <a:ext uri="{FF2B5EF4-FFF2-40B4-BE49-F238E27FC236}">
+                <a16:creationId xmlns:a16="http://schemas.microsoft.com/office/drawing/2014/main" id="{623F20F6-8639-ABD5-CCBA-BDB3C1DF7A7F}"/>
+              </a:ext>
+            </a:extLst>
+          </p:cNvPr>
+          <p:cNvSpPr txBox="1"/>
+          <p:nvPr/>
+        </p:nvSpPr>
+        <p:spPr>
+          <a:xfrm>
+            <a:off x="6225267" y="87834"/>
+            <a:ext cx="5858016" cy="400110"/>
+          </a:xfrm>
+          <a:prstGeom prst="rect">
+            <a:avLst/>
+          </a:prstGeom>
+          <a:noFill/>
+        </p:spPr>
+        <p:txBody>
+          <a:bodyPr wrap="square" rtlCol="0">
+            <a:spAutoFit/>
+          </a:bodyPr>
+          <a:lstStyle/>
+          <a:p>
+            <a:r>
+              <a:rPr lang="en-US" sz="1000" b="1" dirty="0"/>
+              <a:t>Microsoft 2024 SEC 10-K Document</a:t>
+            </a:r>
+          </a:p>
+          <a:p>
+            <a:r>
+              <a:rPr lang="en-US" sz="1000" b="1" dirty="0"/>
+              <a:t>Risk Factors - Business Model Competition Section</a:t>
+            </a:r>
+          </a:p>
+        </p:txBody>
+      </p:sp>
+      <p:sp>
+        <p:nvSpPr>
+          <p:cNvPr id="70" name="Rectangle: Rounded Corners 69">
+            <a:extLst>
+              <a:ext uri="{FF2B5EF4-FFF2-40B4-BE49-F238E27FC236}">
+                <a16:creationId xmlns:a16="http://schemas.microsoft.com/office/drawing/2014/main" id="{CFCE898E-9792-607A-C84E-26B57D5A4A5F}"/>
+              </a:ext>
+            </a:extLst>
+          </p:cNvPr>
+          <p:cNvSpPr/>
+          <p:nvPr/>
+        </p:nvSpPr>
+        <p:spPr>
+          <a:xfrm>
+            <a:off x="6225269" y="508070"/>
+            <a:ext cx="5858016" cy="3410787"/>
+          </a:xfrm>
+          <a:prstGeom prst="roundRect">
+            <a:avLst/>
+          </a:prstGeom>
+          <a:solidFill>
+            <a:schemeClr val="bg1"/>
+          </a:solidFill>
+          <a:ln w="9525"/>
+        </p:spPr>
+        <p:style>
+          <a:lnRef idx="2">
+            <a:schemeClr val="accent1">
+              <a:shade val="15000"/>
+            </a:schemeClr>
+          </a:lnRef>
+          <a:fillRef idx="1">
+            <a:schemeClr val="accent1"/>
+          </a:fillRef>
+          <a:effectRef idx="0">
+            <a:schemeClr val="accent1"/>
+          </a:effectRef>
+          <a:fontRef idx="minor">
+            <a:schemeClr val="lt1"/>
+          </a:fontRef>
+        </p:style>
+        <p:txBody>
+          <a:bodyPr rtlCol="0" anchor="t"/>
+          <a:lstStyle/>
+          <a:p>
+            <a:pPr algn="just">
+              <a:spcBef>
+                <a:spcPts val="900"/>
+              </a:spcBef>
+            </a:pPr>
+            <a:r>
+              <a:rPr lang="en-US" sz="700" b="0" i="0" dirty="0">
+                <a:solidFill>
+                  <a:srgbClr val="000000"/>
+                </a:solidFill>
+                <a:effectLst/>
+                <a:latin typeface="Cascadia Mono" panose="020B0609020000020004" pitchFamily="49" charset="0"/>
+                <a:cs typeface="Cascadia Mono" panose="020B0609020000020004" pitchFamily="49" charset="0"/>
+              </a:rPr>
+              <a:t>Companies compete with us based on a growing variety of business models.</a:t>
+            </a:r>
+          </a:p>
+          <a:p>
+            <a:pPr algn="just">
+              <a:spcBef>
+                <a:spcPts val="450"/>
+              </a:spcBef>
+            </a:pPr>
+            <a:r>
+              <a:rPr lang="en-US" sz="700" b="0" i="0" dirty="0">
+                <a:solidFill>
+                  <a:srgbClr val="000000"/>
+                </a:solidFill>
+                <a:effectLst/>
+                <a:latin typeface="Cascadia Mono" panose="020B0609020000020004" pitchFamily="49" charset="0"/>
+                <a:cs typeface="Cascadia Mono" panose="020B0609020000020004" pitchFamily="49" charset="0"/>
+              </a:rPr>
+              <a:t>•A material part of our business involves cloud-based services available across the spectrum of computing devices. Our competitors continue to develop and deploy cloud-based services for consumers and business customers, and pricing and delivery models are evolving. We and our competitors are devoting significant resources to develop and deploy our cloud-based strategies.</a:t>
+            </a:r>
+          </a:p>
+          <a:p>
+            <a:pPr algn="just">
+              <a:spcBef>
+                <a:spcPts val="450"/>
+              </a:spcBef>
+            </a:pPr>
+            <a:r>
+              <a:rPr lang="en-US" sz="700" b="0" i="0" dirty="0">
+                <a:solidFill>
+                  <a:srgbClr val="000000"/>
+                </a:solidFill>
+                <a:effectLst/>
+                <a:latin typeface="Cascadia Mono" panose="020B0609020000020004" pitchFamily="49" charset="0"/>
+                <a:cs typeface="Cascadia Mono" panose="020B0609020000020004" pitchFamily="49" charset="0"/>
+              </a:rPr>
+              <a:t>•We are investing in artificial intelligence (“AI”) across the entire company and infusing generative AI capabilities into our consumer and commercial offerings. We expect AI technology and services to be a highly competitive and rapidly evolving market, and new competitors continue to enter the market. We will bear significant development and operational costs to build and support the AI models, services, platforms, and infrastructure necessary to meet the needs of our customers. To compete effectively we must also be responsive to technological change, new and potential regulatory developments, and public scrutiny.</a:t>
+            </a:r>
+          </a:p>
+          <a:p>
+            <a:pPr algn="just">
+              <a:spcBef>
+                <a:spcPts val="450"/>
+              </a:spcBef>
+            </a:pPr>
+            <a:r>
+              <a:rPr lang="en-US" sz="700" b="0" i="0" dirty="0">
+                <a:solidFill>
+                  <a:srgbClr val="000000"/>
+                </a:solidFill>
+                <a:effectLst/>
+                <a:latin typeface="Cascadia Mono" panose="020B0609020000020004" pitchFamily="49" charset="0"/>
+                <a:cs typeface="Cascadia Mono" panose="020B0609020000020004" pitchFamily="49" charset="0"/>
+              </a:rPr>
+              <a:t>•Even as we transition more of our business to infrastructure-, platform-, and software-as-a-service business model, the license-based proprietary software model generates a substantial portion of our software revenue. We bear the costs of converting original ideas into software products through investments in research and development, offsetting these costs with the revenue received from licensing our products. Many of our competitors also develop and sell software to businesses and consumers under this model.</a:t>
+            </a:r>
+          </a:p>
+          <a:p>
+            <a:pPr algn="just">
+              <a:spcBef>
+                <a:spcPts val="450"/>
+              </a:spcBef>
+            </a:pPr>
+            <a:r>
+              <a:rPr lang="en-US" sz="700" b="0" i="0" dirty="0">
+                <a:solidFill>
+                  <a:srgbClr val="000000"/>
+                </a:solidFill>
+                <a:effectLst/>
+                <a:latin typeface="Cascadia Mono" panose="020B0609020000020004" pitchFamily="49" charset="0"/>
+                <a:cs typeface="Cascadia Mono" panose="020B0609020000020004" pitchFamily="49" charset="0"/>
+              </a:rPr>
+              <a:t>•Other competitors develop and offer free applications, online services, and content, and make money by selling third-party advertising. Advertising revenue funds development of products and services these competitors provide to users at little or no cost, competing directly with our revenue-generating products.</a:t>
+            </a:r>
+          </a:p>
+          <a:p>
+            <a:pPr algn="just">
+              <a:spcBef>
+                <a:spcPts val="450"/>
+              </a:spcBef>
+            </a:pPr>
+            <a:r>
+              <a:rPr lang="en-US" sz="700" b="0" i="0" dirty="0">
+                <a:solidFill>
+                  <a:srgbClr val="000000"/>
+                </a:solidFill>
+                <a:effectLst/>
+                <a:latin typeface="Cascadia Mono" panose="020B0609020000020004" pitchFamily="49" charset="0"/>
+                <a:cs typeface="Cascadia Mono" panose="020B0609020000020004" pitchFamily="49" charset="0"/>
+              </a:rPr>
+              <a:t>•Some companies compete with us by modifying and then distributing open source software at little or no cost to end users, using open source AI models, and earning revenue on advertising or integrated products and services. These firms do not bear the full costs of research and development for the open source products. Some open source products mimic the features and functionality of our products.</a:t>
+            </a:r>
+          </a:p>
+          <a:p>
+            <a:pPr algn="just">
+              <a:spcBef>
+                <a:spcPts val="900"/>
+              </a:spcBef>
+              <a:spcAft>
+                <a:spcPts val="0"/>
+              </a:spcAft>
+            </a:pPr>
+            <a:endParaRPr lang="en-US" sz="700" b="0" i="0" dirty="0">
+              <a:solidFill>
+                <a:srgbClr val="000000"/>
+              </a:solidFill>
+              <a:effectLst/>
+              <a:latin typeface="Cascadia Mono" panose="020B0609020000020004" pitchFamily="49" charset="0"/>
+              <a:cs typeface="Cascadia Mono" panose="020B0609020000020004" pitchFamily="49" charset="0"/>
+            </a:endParaRPr>
+          </a:p>
+        </p:txBody>
+      </p:sp>
+      <p:cxnSp>
+        <p:nvCxnSpPr>
+          <p:cNvPr id="78" name="Connector: Curved 77">
+            <a:extLst>
+              <a:ext uri="{FF2B5EF4-FFF2-40B4-BE49-F238E27FC236}">
+                <a16:creationId xmlns:a16="http://schemas.microsoft.com/office/drawing/2014/main" id="{F167CB72-3715-7AE0-84C7-073635FB10BF}"/>
+              </a:ext>
+            </a:extLst>
+          </p:cNvPr>
+          <p:cNvCxnSpPr>
+            <a:cxnSpLocks/>
+            <a:stCxn id="38" idx="2"/>
+            <a:endCxn id="40" idx="0"/>
+          </p:cNvCxnSpPr>
+          <p:nvPr/>
+        </p:nvCxnSpPr>
+        <p:spPr>
+          <a:xfrm rot="16200000" flipH="1">
+            <a:off x="4370508" y="2586072"/>
+            <a:ext cx="392706" cy="3058275"/>
+          </a:xfrm>
+          <a:prstGeom prst="curvedConnector3">
+            <a:avLst/>
+          </a:prstGeom>
+          <a:ln>
+            <a:tailEnd type="triangle"/>
+          </a:ln>
+        </p:spPr>
+        <p:style>
+          <a:lnRef idx="1">
+            <a:schemeClr val="accent1"/>
+          </a:lnRef>
+          <a:fillRef idx="0">
+            <a:schemeClr val="accent1"/>
+          </a:fillRef>
+          <a:effectRef idx="0">
+            <a:schemeClr val="accent1"/>
+          </a:effectRef>
+          <a:fontRef idx="minor">
+            <a:schemeClr val="tx1"/>
+          </a:fontRef>
+        </p:style>
+      </p:cxnSp>
+      <p:cxnSp>
+        <p:nvCxnSpPr>
+          <p:cNvPr id="81" name="Connector: Curved 80">
+            <a:extLst>
+              <a:ext uri="{FF2B5EF4-FFF2-40B4-BE49-F238E27FC236}">
+                <a16:creationId xmlns:a16="http://schemas.microsoft.com/office/drawing/2014/main" id="{7EC3D8DA-D5DF-890F-EB8B-9E9CB87D21B6}"/>
+              </a:ext>
+            </a:extLst>
+          </p:cNvPr>
+          <p:cNvCxnSpPr>
+            <a:cxnSpLocks/>
+            <a:stCxn id="70" idx="2"/>
+            <a:endCxn id="40" idx="0"/>
+          </p:cNvCxnSpPr>
+          <p:nvPr/>
+        </p:nvCxnSpPr>
+        <p:spPr>
+          <a:xfrm rot="5400000">
+            <a:off x="7428785" y="2586071"/>
+            <a:ext cx="392706" cy="3058278"/>
+          </a:xfrm>
+          <a:prstGeom prst="curvedConnector3">
+            <a:avLst/>
+          </a:prstGeom>
+          <a:ln>
+            <a:tailEnd type="triangle"/>
+          </a:ln>
+        </p:spPr>
+        <p:style>
+          <a:lnRef idx="1">
+            <a:schemeClr val="accent1"/>
+          </a:lnRef>
+          <a:fillRef idx="0">
+            <a:schemeClr val="accent1"/>
+          </a:fillRef>
+          <a:effectRef idx="0">
+            <a:schemeClr val="accent1"/>
+          </a:effectRef>
+          <a:fontRef idx="minor">
+            <a:schemeClr val="tx1"/>
+          </a:fontRef>
+        </p:style>
+      </p:cxnSp>
+      <p:sp>
+        <p:nvSpPr>
+          <p:cNvPr id="86" name="TextBox 85">
+            <a:extLst>
+              <a:ext uri="{FF2B5EF4-FFF2-40B4-BE49-F238E27FC236}">
+                <a16:creationId xmlns:a16="http://schemas.microsoft.com/office/drawing/2014/main" id="{5B4FC51A-D7E5-8406-91D1-2746D4208DEF}"/>
+              </a:ext>
+            </a:extLst>
+          </p:cNvPr>
+          <p:cNvSpPr txBox="1"/>
+          <p:nvPr/>
+        </p:nvSpPr>
+        <p:spPr>
+          <a:xfrm>
+            <a:off x="108715" y="87834"/>
+            <a:ext cx="5858016" cy="400110"/>
+          </a:xfrm>
+          <a:prstGeom prst="rect">
+            <a:avLst/>
+          </a:prstGeom>
+          <a:noFill/>
+        </p:spPr>
+        <p:txBody>
+          <a:bodyPr wrap="square" rtlCol="0">
+            <a:spAutoFit/>
+          </a:bodyPr>
+          <a:lstStyle/>
+          <a:p>
+            <a:r>
+              <a:rPr lang="en-US" sz="1000" b="1" dirty="0"/>
+              <a:t>Microsoft 2023 SEC 10-K Document</a:t>
+            </a:r>
+          </a:p>
+          <a:p>
+            <a:r>
+              <a:rPr lang="en-US" sz="1000" b="1" dirty="0"/>
+              <a:t>Risk Factors - Business Model Competition Section</a:t>
+            </a:r>
+          </a:p>
+        </p:txBody>
+      </p:sp>
+      <p:sp>
+        <p:nvSpPr>
+          <p:cNvPr id="101" name="Rectangle: Rounded Corners 100">
+            <a:extLst>
+              <a:ext uri="{FF2B5EF4-FFF2-40B4-BE49-F238E27FC236}">
+                <a16:creationId xmlns:a16="http://schemas.microsoft.com/office/drawing/2014/main" id="{1FF2F74E-D915-7B2D-97E8-8004133A093C}"/>
+              </a:ext>
+            </a:extLst>
+          </p:cNvPr>
+          <p:cNvSpPr/>
+          <p:nvPr/>
+        </p:nvSpPr>
+        <p:spPr>
+          <a:xfrm>
+            <a:off x="108714" y="5662931"/>
+            <a:ext cx="11974567" cy="1167425"/>
+          </a:xfrm>
+          <a:prstGeom prst="roundRect">
+            <a:avLst/>
+          </a:prstGeom>
+          <a:solidFill>
+            <a:schemeClr val="bg1"/>
+          </a:solidFill>
+          <a:ln w="9525"/>
+        </p:spPr>
+        <p:style>
+          <a:lnRef idx="2">
+            <a:schemeClr val="accent1">
+              <a:shade val="15000"/>
+            </a:schemeClr>
+          </a:lnRef>
+          <a:fillRef idx="1">
+            <a:schemeClr val="accent1"/>
+          </a:fillRef>
+          <a:effectRef idx="0">
+            <a:schemeClr val="accent1"/>
+          </a:effectRef>
+          <a:fontRef idx="minor">
+            <a:schemeClr val="lt1"/>
+          </a:fontRef>
+        </p:style>
+        <p:txBody>
+          <a:bodyPr rtlCol="0" anchor="t"/>
+          <a:lstStyle/>
+          <a:p>
+            <a:endParaRPr lang="en-US" sz="800" dirty="0">
+              <a:solidFill>
+                <a:schemeClr val="tx1"/>
+              </a:solidFill>
+            </a:endParaRPr>
+          </a:p>
+        </p:txBody>
+      </p:sp>
+      <p:graphicFrame>
+        <p:nvGraphicFramePr>
+          <p:cNvPr id="104" name="Table 103">
+            <a:extLst>
+              <a:ext uri="{FF2B5EF4-FFF2-40B4-BE49-F238E27FC236}">
+                <a16:creationId xmlns:a16="http://schemas.microsoft.com/office/drawing/2014/main" id="{3686F03C-2595-66A9-9592-D71289577059}"/>
+              </a:ext>
+            </a:extLst>
+          </p:cNvPr>
+          <p:cNvGraphicFramePr>
+            <a:graphicFrameLocks noGrp="1"/>
+          </p:cNvGraphicFramePr>
+          <p:nvPr>
+            <p:extLst>
+              <p:ext uri="{D42A27DB-BD31-4B8C-83A1-F6EECF244321}">
+                <p14:modId xmlns:p14="http://schemas.microsoft.com/office/powerpoint/2010/main" val="3520584729"/>
+              </p:ext>
+            </p:extLst>
+          </p:nvPr>
+        </p:nvGraphicFramePr>
+        <p:xfrm>
+          <a:off x="310393" y="5713315"/>
+          <a:ext cx="11522277" cy="1066800"/>
+        </p:xfrm>
+        <a:graphic>
+          <a:graphicData uri="http://schemas.openxmlformats.org/drawingml/2006/table">
+            <a:tbl>
+              <a:tblPr firstRow="1" bandRow="1">
+                <a:tableStyleId>{073A0DAA-6AF3-43AB-8588-CEC1D06C72B9}</a:tableStyleId>
+              </a:tblPr>
+              <a:tblGrid>
+                <a:gridCol w="245155">
+                  <a:extLst>
+                    <a:ext uri="{9D8B030D-6E8A-4147-A177-3AD203B41FA5}">
+                      <a16:colId xmlns:a16="http://schemas.microsoft.com/office/drawing/2014/main" val="4231528064"/>
+                    </a:ext>
+                  </a:extLst>
+                </a:gridCol>
+                <a:gridCol w="920406">
+                  <a:extLst>
+                    <a:ext uri="{9D8B030D-6E8A-4147-A177-3AD203B41FA5}">
+                      <a16:colId xmlns:a16="http://schemas.microsoft.com/office/drawing/2014/main" val="1547684084"/>
+                    </a:ext>
+                  </a:extLst>
+                </a:gridCol>
+                <a:gridCol w="3728933">
+                  <a:extLst>
+                    <a:ext uri="{9D8B030D-6E8A-4147-A177-3AD203B41FA5}">
+                      <a16:colId xmlns:a16="http://schemas.microsoft.com/office/drawing/2014/main" val="211056132"/>
+                    </a:ext>
+                  </a:extLst>
+                </a:gridCol>
+                <a:gridCol w="3522487">
+                  <a:extLst>
+                    <a:ext uri="{9D8B030D-6E8A-4147-A177-3AD203B41FA5}">
+                      <a16:colId xmlns:a16="http://schemas.microsoft.com/office/drawing/2014/main" val="1401851626"/>
+                    </a:ext>
+                  </a:extLst>
+                </a:gridCol>
+                <a:gridCol w="3105296">
+                  <a:extLst>
+                    <a:ext uri="{9D8B030D-6E8A-4147-A177-3AD203B41FA5}">
+                      <a16:colId xmlns:a16="http://schemas.microsoft.com/office/drawing/2014/main" val="2378001542"/>
+                    </a:ext>
+                  </a:extLst>
+                </a:gridCol>
+              </a:tblGrid>
+              <a:tr h="181436">
+                <a:tc>
+                  <a:txBody>
+                    <a:bodyPr/>
+                    <a:lstStyle/>
+                    <a:p>
+                      <a:r>
+                        <a:rPr lang="en-US" sz="1000" b="1" dirty="0"/>
+                        <a:t>#</a:t>
+                      </a:r>
+                    </a:p>
+                  </a:txBody>
+                  <a:tcPr/>
+                </a:tc>
+                <a:tc>
+                  <a:txBody>
+                    <a:bodyPr/>
+                    <a:lstStyle/>
+                    <a:p>
+                      <a:r>
+                        <a:rPr lang="en-US" sz="1000" b="1" dirty="0"/>
+                        <a:t>Title</a:t>
+                      </a:r>
+                    </a:p>
+                  </a:txBody>
+                  <a:tcPr/>
+                </a:tc>
+                <a:tc>
+                  <a:txBody>
+                    <a:bodyPr/>
+                    <a:lstStyle/>
+                    <a:p>
+                      <a:r>
+                        <a:rPr lang="en-US" sz="1000" b="1" i="0" kern="1200" dirty="0">
+                          <a:solidFill>
+                            <a:schemeClr val="lt1"/>
+                          </a:solidFill>
+                          <a:effectLst/>
+                          <a:latin typeface="+mn-lt"/>
+                          <a:ea typeface="+mn-ea"/>
+                          <a:cs typeface="+mn-cs"/>
+                        </a:rPr>
+                        <a:t>2023 Risk Factor Summary</a:t>
+                      </a:r>
+                      <a:endParaRPr lang="en-US" sz="1000" b="1" dirty="0"/>
+                    </a:p>
+                  </a:txBody>
+                  <a:tcPr/>
+                </a:tc>
+                <a:tc>
+                  <a:txBody>
+                    <a:bodyPr/>
+                    <a:lstStyle/>
+                    <a:p>
+                      <a:r>
+                        <a:rPr lang="en-US" sz="1000" b="1" i="0" kern="1200" dirty="0">
+                          <a:solidFill>
+                            <a:schemeClr val="lt1"/>
+                          </a:solidFill>
+                          <a:effectLst/>
+                          <a:latin typeface="+mn-lt"/>
+                          <a:ea typeface="+mn-ea"/>
+                          <a:cs typeface="+mn-cs"/>
+                        </a:rPr>
+                        <a:t>2024 Risk Factor Summary</a:t>
+                      </a:r>
+                      <a:endParaRPr lang="en-US" sz="1000" b="1" dirty="0"/>
+                    </a:p>
+                  </a:txBody>
+                  <a:tcPr/>
+                </a:tc>
+                <a:tc>
+                  <a:txBody>
+                    <a:bodyPr/>
+                    <a:lstStyle/>
+                    <a:p>
+                      <a:r>
+                        <a:rPr lang="en-US" sz="1000" b="1" dirty="0"/>
+                        <a:t>Change</a:t>
+                      </a:r>
+                    </a:p>
+                  </a:txBody>
+                  <a:tcPr/>
+                </a:tc>
+                <a:extLst>
+                  <a:ext uri="{0D108BD9-81ED-4DB2-BD59-A6C34878D82A}">
+                    <a16:rowId xmlns:a16="http://schemas.microsoft.com/office/drawing/2014/main" val="2159735917"/>
+                  </a:ext>
+                </a:extLst>
+              </a:tr>
+              <a:tr h="782243">
+                <a:tc>
+                  <a:txBody>
+                    <a:bodyPr/>
+                    <a:lstStyle/>
+                    <a:p>
+                      <a:r>
+                        <a:rPr lang="en-US" sz="800" dirty="0"/>
+                        <a:t>1</a:t>
+                      </a:r>
+                    </a:p>
+                  </a:txBody>
+                  <a:tcPr/>
+                </a:tc>
+                <a:tc>
+                  <a:txBody>
+                    <a:bodyPr/>
+                    <a:lstStyle/>
+                    <a:p>
+                      <a:r>
+                        <a:rPr lang="en-US" sz="800" b="0" i="0" kern="1200" dirty="0">
+                          <a:solidFill>
+                            <a:schemeClr val="dk1"/>
+                          </a:solidFill>
+                          <a:effectLst/>
+                          <a:latin typeface="+mn-lt"/>
+                          <a:ea typeface="+mn-ea"/>
+                          <a:cs typeface="+mn-cs"/>
+                        </a:rPr>
+                        <a:t>Business model competition</a:t>
+                      </a:r>
+                      <a:endParaRPr lang="en-US" sz="800" dirty="0"/>
+                    </a:p>
+                  </a:txBody>
+                  <a:tcPr/>
+                </a:tc>
+                <a:tc>
+                  <a:txBody>
+                    <a:bodyPr/>
+                    <a:lstStyle/>
+                    <a:p>
+                      <a:r>
+                        <a:rPr lang="en-US" sz="800" b="0" i="0" kern="1200" dirty="0">
+                          <a:solidFill>
+                            <a:schemeClr val="dk1"/>
+                          </a:solidFill>
+                          <a:effectLst/>
+                          <a:latin typeface="+mn-lt"/>
+                          <a:ea typeface="+mn-ea"/>
+                          <a:cs typeface="+mn-cs"/>
+                        </a:rPr>
+                        <a:t>Competitors use various business models. Microsoft is transitioning to cloud-based services, investing in AI, competes with firms offering free applications funded by advertising, and faces competition from companies using open source software. Competitive pressures may lead to lower revenue and margins.</a:t>
+                      </a:r>
+                      <a:endParaRPr lang="en-US" sz="800" dirty="0"/>
+                    </a:p>
+                  </a:txBody>
+                  <a:tcPr/>
+                </a:tc>
+                <a:tc>
+                  <a:txBody>
+                    <a:bodyPr/>
+                    <a:lstStyle/>
+                    <a:p>
+                      <a:r>
+                        <a:rPr lang="en-US" sz="800" b="0" i="0" kern="1200" dirty="0">
+                          <a:solidFill>
+                            <a:schemeClr val="dk1"/>
+                          </a:solidFill>
+                          <a:effectLst/>
+                          <a:latin typeface="+mn-lt"/>
+                          <a:ea typeface="+mn-ea"/>
+                          <a:cs typeface="+mn-cs"/>
+                        </a:rPr>
+                        <a:t>Emphasis on cloud-based services as a significant part of the business. Investing in AI across the company; the AI market is expected to be highly competitive and rapidly evolving, with new competitors entering. License-based software still generates substantial revenue. Similar competition from free applications and open source software. Competitive pressures may adversely affect financial condition and results.</a:t>
+                      </a:r>
+                      <a:endParaRPr lang="en-US" sz="800" dirty="0"/>
+                    </a:p>
+                  </a:txBody>
+                  <a:tcPr/>
+                </a:tc>
+                <a:tc>
+                  <a:txBody>
+                    <a:bodyPr/>
+                    <a:lstStyle/>
+                    <a:p>
+                      <a:r>
+                        <a:rPr lang="en-US" sz="800" b="0" i="0" kern="1200" dirty="0">
+                          <a:solidFill>
+                            <a:schemeClr val="dk1"/>
+                          </a:solidFill>
+                          <a:effectLst/>
+                          <a:latin typeface="+mn-lt"/>
+                          <a:ea typeface="+mn-ea"/>
+                          <a:cs typeface="+mn-cs"/>
+                        </a:rPr>
+                        <a:t>Increased emphasis on AI investment and competition, noting that new competitors continue to enter the AI market. Acknowledges that competitive pressures may adversely affect financial condition and results. Wording adjusted to reflect these changes.</a:t>
+                      </a:r>
+                      <a:endParaRPr lang="en-US" sz="800" dirty="0"/>
+                    </a:p>
+                  </a:txBody>
+                  <a:tcPr/>
+                </a:tc>
+                <a:extLst>
+                  <a:ext uri="{0D108BD9-81ED-4DB2-BD59-A6C34878D82A}">
+                    <a16:rowId xmlns:a16="http://schemas.microsoft.com/office/drawing/2014/main" val="3216057768"/>
+                  </a:ext>
+                </a:extLst>
+              </a:tr>
+            </a:tbl>
+          </a:graphicData>
+        </a:graphic>
+      </p:graphicFrame>
+      <p:cxnSp>
+        <p:nvCxnSpPr>
+          <p:cNvPr id="106" name="Straight Arrow Connector 105">
+            <a:extLst>
+              <a:ext uri="{FF2B5EF4-FFF2-40B4-BE49-F238E27FC236}">
+                <a16:creationId xmlns:a16="http://schemas.microsoft.com/office/drawing/2014/main" id="{3398634F-0812-DAE0-8E16-C85CD8C271AC}"/>
+              </a:ext>
+            </a:extLst>
+          </p:cNvPr>
+          <p:cNvCxnSpPr>
+            <a:stCxn id="40" idx="2"/>
+          </p:cNvCxnSpPr>
+          <p:nvPr/>
+        </p:nvCxnSpPr>
+        <p:spPr>
+          <a:xfrm>
+            <a:off x="6095999" y="5226341"/>
+            <a:ext cx="0" cy="436591"/>
+          </a:xfrm>
+          <a:prstGeom prst="straightConnector1">
+            <a:avLst/>
+          </a:prstGeom>
+          <a:ln>
+            <a:tailEnd type="triangle"/>
+          </a:ln>
+        </p:spPr>
+        <p:style>
+          <a:lnRef idx="1">
+            <a:schemeClr val="accent1"/>
+          </a:lnRef>
+          <a:fillRef idx="0">
+            <a:schemeClr val="accent1"/>
+          </a:fillRef>
+          <a:effectRef idx="0">
+            <a:schemeClr val="accent1"/>
+          </a:effectRef>
+          <a:fontRef idx="minor">
+            <a:schemeClr val="tx1"/>
+          </a:fontRef>
+        </p:style>
+      </p:cxnSp>
+      <p:sp>
+        <p:nvSpPr>
+          <p:cNvPr id="107" name="TextBox 106">
+            <a:extLst>
+              <a:ext uri="{FF2B5EF4-FFF2-40B4-BE49-F238E27FC236}">
+                <a16:creationId xmlns:a16="http://schemas.microsoft.com/office/drawing/2014/main" id="{B2C4002D-2945-F1A3-4637-181E40520B9A}"/>
+              </a:ext>
+            </a:extLst>
+          </p:cNvPr>
+          <p:cNvSpPr txBox="1"/>
+          <p:nvPr/>
+        </p:nvSpPr>
+        <p:spPr>
+          <a:xfrm>
+            <a:off x="310393" y="5372298"/>
+            <a:ext cx="4492303" cy="246221"/>
+          </a:xfrm>
+          <a:prstGeom prst="rect">
+            <a:avLst/>
+          </a:prstGeom>
+          <a:noFill/>
+        </p:spPr>
+        <p:txBody>
+          <a:bodyPr wrap="square" rtlCol="0">
+            <a:spAutoFit/>
+          </a:bodyPr>
+          <a:lstStyle/>
+          <a:p>
+            <a:r>
+              <a:rPr lang="en-US" sz="1000" b="1" dirty="0"/>
+              <a:t>Azure OpenAI o1 Series Model Generation – Comparison &amp; Change Risk Analysis</a:t>
+            </a:r>
+          </a:p>
+        </p:txBody>
+      </p:sp>
+      <p:pic>
+        <p:nvPicPr>
+          <p:cNvPr id="108" name="Picture 107">
+            <a:extLst>
+              <a:ext uri="{FF2B5EF4-FFF2-40B4-BE49-F238E27FC236}">
+                <a16:creationId xmlns:a16="http://schemas.microsoft.com/office/drawing/2014/main" id="{5FCF349C-7FA6-F8B4-F597-51D33D557E72}"/>
+              </a:ext>
+            </a:extLst>
+          </p:cNvPr>
+          <p:cNvPicPr>
+            <a:picLocks noChangeAspect="1"/>
+          </p:cNvPicPr>
+          <p:nvPr/>
+        </p:nvPicPr>
+        <p:blipFill>
+          <a:blip r:embed="rId2">
+            <a:extLst>
+              <a:ext uri="{28A0092B-C50C-407E-A947-70E740481C1C}">
+                <a14:useLocalDpi xmlns:a14="http://schemas.microsoft.com/office/drawing/2010/main" val="0"/>
+              </a:ext>
+            </a:extLst>
+          </a:blip>
+          <a:stretch>
+            <a:fillRect/>
+          </a:stretch>
+        </p:blipFill>
+        <p:spPr>
+          <a:xfrm>
+            <a:off x="108714" y="5351604"/>
+            <a:ext cx="256589" cy="260017"/>
+          </a:xfrm>
+          <a:prstGeom prst="rect">
+            <a:avLst/>
+          </a:prstGeom>
+        </p:spPr>
+      </p:pic>
+    </p:spTree>
+    <p:extLst>
+      <p:ext uri="{BB962C8B-B14F-4D97-AF65-F5344CB8AC3E}">
+        <p14:creationId xmlns:p14="http://schemas.microsoft.com/office/powerpoint/2010/main" val="577122949"/>
+      </p:ext>
+    </p:extLst>
+  </p:cSld>
+  <p:clrMapOvr>
+    <a:masterClrMapping/>
+  </p:clrMapOvr>
+</p:sld>
+</file>
+
 <file path=ppt/theme/theme1.xml><?xml version="1.0" encoding="utf-8"?>
 <a:theme xmlns:a="http://schemas.openxmlformats.org/drawingml/2006/main" name="Office Theme">
   <a:themeElements>

</xml_diff>